<commit_message>
trouble shooting migration.py with polars
</commit_message>
<xml_diff>
--- a/script_layout.pptx
+++ b/script_layout.pptx
@@ -5,8 +5,9 @@
     <p:sldMasterId id="2147483648" r:id="rId1"/>
   </p:sldMasterIdLst>
   <p:sldIdLst>
-    <p:sldId id="256" r:id="rId2"/>
+    <p:sldId id="258" r:id="rId2"/>
     <p:sldId id="257" r:id="rId3"/>
+    <p:sldId id="256" r:id="rId4"/>
   </p:sldIdLst>
   <p:sldSz cx="12192000" cy="6858000"/>
   <p:notesSz cx="6858000" cy="9144000"/>
@@ -105,7 +106,191 @@
       </a:defRPr>
     </a:lvl9pPr>
   </p:defaultTextStyle>
+  <p:extLst>
+    <p:ext uri="{EFAFB233-063F-42B5-8137-9DF3F51BA10A}">
+      <p15:sldGuideLst xmlns:p15="http://schemas.microsoft.com/office/powerpoint/2012/main"/>
+    </p:ext>
+  </p:extLst>
 </p:presentation>
+</file>
+
+<file path=ppt/revisionInfo.xml><?xml version="1.0" encoding="utf-8"?>
+<p1510:revInfo xmlns:a="http://schemas.openxmlformats.org/drawingml/2006/main" xmlns:r="http://schemas.openxmlformats.org/officeDocument/2006/relationships" xmlns:p1510="http://schemas.microsoft.com/office/powerpoint/2015/10/main">
+  <p1510:revLst>
+    <p1510:client id="{74E6C97F-B443-4105-A1B5-F5B94B54E891}" v="1" dt="2025-04-03T11:05:49.306"/>
+  </p1510:revLst>
+</p1510:revInfo>
+</file>
+
+<file path=ppt/changesInfos/changesInfo1.xml><?xml version="1.0" encoding="utf-8"?>
+<pc:chgInfo xmlns:a="http://schemas.openxmlformats.org/drawingml/2006/main" xmlns:r="http://schemas.openxmlformats.org/officeDocument/2006/relationships" xmlns:ac="http://schemas.microsoft.com/office/drawing/2013/main/command" xmlns:pc="http://schemas.microsoft.com/office/powerpoint/2013/main/command">
+  <pc:docChgLst>
+    <pc:chgData name="Phil Morefield" userId="5a43f8f3820cb67c" providerId="LiveId" clId="{74E6C97F-B443-4105-A1B5-F5B94B54E891}"/>
+    <pc:docChg chg="custSel addSld modSld sldOrd">
+      <pc:chgData name="Phil Morefield" userId="5a43f8f3820cb67c" providerId="LiveId" clId="{74E6C97F-B443-4105-A1B5-F5B94B54E891}" dt="2025-04-03T11:07:01.346" v="19" actId="478"/>
+      <pc:docMkLst>
+        <pc:docMk/>
+      </pc:docMkLst>
+      <pc:sldChg chg="delSp modSp mod ord">
+        <pc:chgData name="Phil Morefield" userId="5a43f8f3820cb67c" providerId="LiveId" clId="{74E6C97F-B443-4105-A1B5-F5B94B54E891}" dt="2025-04-03T11:07:01.346" v="19" actId="478"/>
+        <pc:sldMkLst>
+          <pc:docMk/>
+          <pc:sldMk cId="863778225" sldId="256"/>
+        </pc:sldMkLst>
+        <pc:spChg chg="del topLvl">
+          <ac:chgData name="Phil Morefield" userId="5a43f8f3820cb67c" providerId="LiveId" clId="{74E6C97F-B443-4105-A1B5-F5B94B54E891}" dt="2025-04-03T11:06:52.307" v="14" actId="478"/>
+          <ac:spMkLst>
+            <pc:docMk/>
+            <pc:sldMk cId="863778225" sldId="256"/>
+            <ac:spMk id="4" creationId="{C4992DB3-079E-6F07-E07F-C61D86FC07E9}"/>
+          </ac:spMkLst>
+        </pc:spChg>
+        <pc:spChg chg="del topLvl">
+          <ac:chgData name="Phil Morefield" userId="5a43f8f3820cb67c" providerId="LiveId" clId="{74E6C97F-B443-4105-A1B5-F5B94B54E891}" dt="2025-04-03T11:06:55.297" v="16" actId="478"/>
+          <ac:spMkLst>
+            <pc:docMk/>
+            <pc:sldMk cId="863778225" sldId="256"/>
+            <ac:spMk id="5" creationId="{60D2601A-CC45-3754-8278-84994930F363}"/>
+          </ac:spMkLst>
+        </pc:spChg>
+        <pc:grpChg chg="del">
+          <ac:chgData name="Phil Morefield" userId="5a43f8f3820cb67c" providerId="LiveId" clId="{74E6C97F-B443-4105-A1B5-F5B94B54E891}" dt="2025-04-03T11:06:52.307" v="14" actId="478"/>
+          <ac:grpSpMkLst>
+            <pc:docMk/>
+            <pc:sldMk cId="863778225" sldId="256"/>
+            <ac:grpSpMk id="6" creationId="{061F2BC8-79B0-749B-D37C-3BFD661C8C31}"/>
+          </ac:grpSpMkLst>
+        </pc:grpChg>
+        <pc:grpChg chg="del">
+          <ac:chgData name="Phil Morefield" userId="5a43f8f3820cb67c" providerId="LiveId" clId="{74E6C97F-B443-4105-A1B5-F5B94B54E891}" dt="2025-04-03T11:06:59.808" v="18" actId="478"/>
+          <ac:grpSpMkLst>
+            <pc:docMk/>
+            <pc:sldMk cId="863778225" sldId="256"/>
+            <ac:grpSpMk id="12" creationId="{D3934392-9AE5-98BF-0670-FCFEB6ECE21A}"/>
+          </ac:grpSpMkLst>
+        </pc:grpChg>
+        <pc:grpChg chg="del">
+          <ac:chgData name="Phil Morefield" userId="5a43f8f3820cb67c" providerId="LiveId" clId="{74E6C97F-B443-4105-A1B5-F5B94B54E891}" dt="2025-04-03T11:06:58.202" v="17" actId="478"/>
+          <ac:grpSpMkLst>
+            <pc:docMk/>
+            <pc:sldMk cId="863778225" sldId="256"/>
+            <ac:grpSpMk id="15" creationId="{E0DF2793-1493-3FCE-5E4C-CA6ECBDE8DE1}"/>
+          </ac:grpSpMkLst>
+        </pc:grpChg>
+        <pc:grpChg chg="del">
+          <ac:chgData name="Phil Morefield" userId="5a43f8f3820cb67c" providerId="LiveId" clId="{74E6C97F-B443-4105-A1B5-F5B94B54E891}" dt="2025-04-03T11:07:01.346" v="19" actId="478"/>
+          <ac:grpSpMkLst>
+            <pc:docMk/>
+            <pc:sldMk cId="863778225" sldId="256"/>
+            <ac:grpSpMk id="18" creationId="{96788434-693A-BFF5-443E-7361E12A1365}"/>
+          </ac:grpSpMkLst>
+        </pc:grpChg>
+        <pc:cxnChg chg="del mod">
+          <ac:chgData name="Phil Morefield" userId="5a43f8f3820cb67c" providerId="LiveId" clId="{74E6C97F-B443-4105-A1B5-F5B94B54E891}" dt="2025-04-03T11:06:53.477" v="15" actId="478"/>
+          <ac:cxnSpMkLst>
+            <pc:docMk/>
+            <pc:sldMk cId="863778225" sldId="256"/>
+            <ac:cxnSpMk id="11" creationId="{F2CF6455-0992-97F1-B1EE-E45C46B8E130}"/>
+          </ac:cxnSpMkLst>
+        </pc:cxnChg>
+      </pc:sldChg>
+      <pc:sldChg chg="ord">
+        <pc:chgData name="Phil Morefield" userId="5a43f8f3820cb67c" providerId="LiveId" clId="{74E6C97F-B443-4105-A1B5-F5B94B54E891}" dt="2025-04-03T11:06:27.661" v="11"/>
+        <pc:sldMkLst>
+          <pc:docMk/>
+          <pc:sldMk cId="2078527769" sldId="257"/>
+        </pc:sldMkLst>
+      </pc:sldChg>
+      <pc:sldChg chg="delSp modSp add mod">
+        <pc:chgData name="Phil Morefield" userId="5a43f8f3820cb67c" providerId="LiveId" clId="{74E6C97F-B443-4105-A1B5-F5B94B54E891}" dt="2025-04-03T11:06:07.160" v="7" actId="478"/>
+        <pc:sldMkLst>
+          <pc:docMk/>
+          <pc:sldMk cId="2616424035" sldId="258"/>
+        </pc:sldMkLst>
+        <pc:spChg chg="del topLvl">
+          <ac:chgData name="Phil Morefield" userId="5a43f8f3820cb67c" providerId="LiveId" clId="{74E6C97F-B443-4105-A1B5-F5B94B54E891}" dt="2025-04-03T11:06:05.252" v="6" actId="478"/>
+          <ac:spMkLst>
+            <pc:docMk/>
+            <pc:sldMk cId="2616424035" sldId="258"/>
+            <ac:spMk id="19" creationId="{45BE1F5B-E3CB-0050-0A13-982F0D8DA511}"/>
+          </ac:spMkLst>
+        </pc:spChg>
+        <pc:spChg chg="del topLvl">
+          <ac:chgData name="Phil Morefield" userId="5a43f8f3820cb67c" providerId="LiveId" clId="{74E6C97F-B443-4105-A1B5-F5B94B54E891}" dt="2025-04-03T11:06:07.160" v="7" actId="478"/>
+          <ac:spMkLst>
+            <pc:docMk/>
+            <pc:sldMk cId="2616424035" sldId="258"/>
+            <ac:spMk id="20" creationId="{8282F9A2-29BB-C066-E535-BE62BAB86E13}"/>
+          </ac:spMkLst>
+        </pc:spChg>
+        <pc:spChg chg="del topLvl">
+          <ac:chgData name="Phil Morefield" userId="5a43f8f3820cb67c" providerId="LiveId" clId="{74E6C97F-B443-4105-A1B5-F5B94B54E891}" dt="2025-04-03T11:05:58.705" v="2" actId="478"/>
+          <ac:spMkLst>
+            <pc:docMk/>
+            <pc:sldMk cId="2616424035" sldId="258"/>
+            <ac:spMk id="22" creationId="{FEA293A0-FEC3-649C-1088-B0EDD6FA6ED4}"/>
+          </ac:spMkLst>
+        </pc:spChg>
+        <pc:spChg chg="del topLvl">
+          <ac:chgData name="Phil Morefield" userId="5a43f8f3820cb67c" providerId="LiveId" clId="{74E6C97F-B443-4105-A1B5-F5B94B54E891}" dt="2025-04-03T11:06:01.712" v="5" actId="478"/>
+          <ac:spMkLst>
+            <pc:docMk/>
+            <pc:sldMk cId="2616424035" sldId="258"/>
+            <ac:spMk id="23" creationId="{1D812081-1C81-CA2F-CA2C-3A405CCD7722}"/>
+          </ac:spMkLst>
+        </pc:spChg>
+        <pc:spChg chg="del topLvl">
+          <ac:chgData name="Phil Morefield" userId="5a43f8f3820cb67c" providerId="LiveId" clId="{74E6C97F-B443-4105-A1B5-F5B94B54E891}" dt="2025-04-03T11:05:56.813" v="1" actId="478"/>
+          <ac:spMkLst>
+            <pc:docMk/>
+            <pc:sldMk cId="2616424035" sldId="258"/>
+            <ac:spMk id="29" creationId="{E94CD7F5-6A74-8864-9DDE-3F3CA94810EF}"/>
+          </ac:spMkLst>
+        </pc:spChg>
+        <pc:spChg chg="del topLvl">
+          <ac:chgData name="Phil Morefield" userId="5a43f8f3820cb67c" providerId="LiveId" clId="{74E6C97F-B443-4105-A1B5-F5B94B54E891}" dt="2025-04-03T11:06:00.764" v="4" actId="478"/>
+          <ac:spMkLst>
+            <pc:docMk/>
+            <pc:sldMk cId="2616424035" sldId="258"/>
+            <ac:spMk id="30" creationId="{F362F2D1-822A-0316-07C3-6E8EBD8A8AA9}"/>
+          </ac:spMkLst>
+        </pc:spChg>
+        <pc:grpChg chg="del">
+          <ac:chgData name="Phil Morefield" userId="5a43f8f3820cb67c" providerId="LiveId" clId="{74E6C97F-B443-4105-A1B5-F5B94B54E891}" dt="2025-04-03T11:06:05.252" v="6" actId="478"/>
+          <ac:grpSpMkLst>
+            <pc:docMk/>
+            <pc:sldMk cId="2616424035" sldId="258"/>
+            <ac:grpSpMk id="18" creationId="{5F09B8B6-24FD-5FFD-2860-7E5FEFC02B0A}"/>
+          </ac:grpSpMkLst>
+        </pc:grpChg>
+        <pc:grpChg chg="del">
+          <ac:chgData name="Phil Morefield" userId="5a43f8f3820cb67c" providerId="LiveId" clId="{74E6C97F-B443-4105-A1B5-F5B94B54E891}" dt="2025-04-03T11:05:58.705" v="2" actId="478"/>
+          <ac:grpSpMkLst>
+            <pc:docMk/>
+            <pc:sldMk cId="2616424035" sldId="258"/>
+            <ac:grpSpMk id="21" creationId="{65F7E4A8-7E06-722A-D703-73480C998014}"/>
+          </ac:grpSpMkLst>
+        </pc:grpChg>
+        <pc:grpChg chg="del">
+          <ac:chgData name="Phil Morefield" userId="5a43f8f3820cb67c" providerId="LiveId" clId="{74E6C97F-B443-4105-A1B5-F5B94B54E891}" dt="2025-04-03T11:05:56.813" v="1" actId="478"/>
+          <ac:grpSpMkLst>
+            <pc:docMk/>
+            <pc:sldMk cId="2616424035" sldId="258"/>
+            <ac:grpSpMk id="28" creationId="{FB112A1D-391A-A500-BA0B-9B34AC39A366}"/>
+          </ac:grpSpMkLst>
+        </pc:grpChg>
+        <pc:cxnChg chg="del mod">
+          <ac:chgData name="Phil Morefield" userId="5a43f8f3820cb67c" providerId="LiveId" clId="{74E6C97F-B443-4105-A1B5-F5B94B54E891}" dt="2025-04-03T11:05:59.946" v="3" actId="478"/>
+          <ac:cxnSpMkLst>
+            <pc:docMk/>
+            <pc:sldMk cId="2616424035" sldId="258"/>
+            <ac:cxnSpMk id="24" creationId="{8FCC8FE8-CD12-6996-B2C3-B503272EFD5A}"/>
+          </ac:cxnSpMkLst>
+        </pc:cxnChg>
+      </pc:sldChg>
+    </pc:docChg>
+  </pc:docChgLst>
+</pc:chgInfo>
 </file>
 
 <file path=ppt/slideLayouts/slideLayout1.xml><?xml version="1.0" encoding="utf-8"?>
@@ -255,7 +440,7 @@
           <a:p>
             <a:fld id="{936CF24A-DDB5-43DE-9BDB-9E287B164851}" type="datetimeFigureOut">
               <a:rPr lang="en-US" smtClean="0"/>
-              <a:t>4/2/2025</a:t>
+              <a:t>4/3/2025</a:t>
             </a:fld>
             <a:endParaRPr lang="en-US"/>
           </a:p>
@@ -453,7 +638,7 @@
           <a:p>
             <a:fld id="{936CF24A-DDB5-43DE-9BDB-9E287B164851}" type="datetimeFigureOut">
               <a:rPr lang="en-US" smtClean="0"/>
-              <a:t>4/2/2025</a:t>
+              <a:t>4/3/2025</a:t>
             </a:fld>
             <a:endParaRPr lang="en-US"/>
           </a:p>
@@ -661,7 +846,7 @@
           <a:p>
             <a:fld id="{936CF24A-DDB5-43DE-9BDB-9E287B164851}" type="datetimeFigureOut">
               <a:rPr lang="en-US" smtClean="0"/>
-              <a:t>4/2/2025</a:t>
+              <a:t>4/3/2025</a:t>
             </a:fld>
             <a:endParaRPr lang="en-US"/>
           </a:p>
@@ -859,7 +1044,7 @@
           <a:p>
             <a:fld id="{936CF24A-DDB5-43DE-9BDB-9E287B164851}" type="datetimeFigureOut">
               <a:rPr lang="en-US" smtClean="0"/>
-              <a:t>4/2/2025</a:t>
+              <a:t>4/3/2025</a:t>
             </a:fld>
             <a:endParaRPr lang="en-US"/>
           </a:p>
@@ -1134,7 +1319,7 @@
           <a:p>
             <a:fld id="{936CF24A-DDB5-43DE-9BDB-9E287B164851}" type="datetimeFigureOut">
               <a:rPr lang="en-US" smtClean="0"/>
-              <a:t>4/2/2025</a:t>
+              <a:t>4/3/2025</a:t>
             </a:fld>
             <a:endParaRPr lang="en-US"/>
           </a:p>
@@ -1399,7 +1584,7 @@
           <a:p>
             <a:fld id="{936CF24A-DDB5-43DE-9BDB-9E287B164851}" type="datetimeFigureOut">
               <a:rPr lang="en-US" smtClean="0"/>
-              <a:t>4/2/2025</a:t>
+              <a:t>4/3/2025</a:t>
             </a:fld>
             <a:endParaRPr lang="en-US"/>
           </a:p>
@@ -1811,7 +1996,7 @@
           <a:p>
             <a:fld id="{936CF24A-DDB5-43DE-9BDB-9E287B164851}" type="datetimeFigureOut">
               <a:rPr lang="en-US" smtClean="0"/>
-              <a:t>4/2/2025</a:t>
+              <a:t>4/3/2025</a:t>
             </a:fld>
             <a:endParaRPr lang="en-US"/>
           </a:p>
@@ -1952,7 +2137,7 @@
           <a:p>
             <a:fld id="{936CF24A-DDB5-43DE-9BDB-9E287B164851}" type="datetimeFigureOut">
               <a:rPr lang="en-US" smtClean="0"/>
-              <a:t>4/2/2025</a:t>
+              <a:t>4/3/2025</a:t>
             </a:fld>
             <a:endParaRPr lang="en-US"/>
           </a:p>
@@ -2065,7 +2250,7 @@
           <a:p>
             <a:fld id="{936CF24A-DDB5-43DE-9BDB-9E287B164851}" type="datetimeFigureOut">
               <a:rPr lang="en-US" smtClean="0"/>
-              <a:t>4/2/2025</a:t>
+              <a:t>4/3/2025</a:t>
             </a:fld>
             <a:endParaRPr lang="en-US"/>
           </a:p>
@@ -2376,7 +2561,7 @@
           <a:p>
             <a:fld id="{936CF24A-DDB5-43DE-9BDB-9E287B164851}" type="datetimeFigureOut">
               <a:rPr lang="en-US" smtClean="0"/>
-              <a:t>4/2/2025</a:t>
+              <a:t>4/3/2025</a:t>
             </a:fld>
             <a:endParaRPr lang="en-US"/>
           </a:p>
@@ -2664,7 +2849,7 @@
           <a:p>
             <a:fld id="{936CF24A-DDB5-43DE-9BDB-9E287B164851}" type="datetimeFigureOut">
               <a:rPr lang="en-US" smtClean="0"/>
-              <a:t>4/2/2025</a:t>
+              <a:t>4/3/2025</a:t>
             </a:fld>
             <a:endParaRPr lang="en-US"/>
           </a:p>
@@ -2905,7 +3090,7 @@
           <a:p>
             <a:fld id="{936CF24A-DDB5-43DE-9BDB-9E287B164851}" type="datetimeFigureOut">
               <a:rPr lang="en-US" smtClean="0"/>
-              <a:t>4/2/2025</a:t>
+              <a:t>4/3/2025</a:t>
             </a:fld>
             <a:endParaRPr lang="en-US"/>
           </a:p>
@@ -3310,7 +3495,13 @@
   <p:cSld>
     <p:spTree>
       <p:nvGrpSpPr>
-        <p:cNvPr id="1" name=""/>
+        <p:cNvPr id="1" name="">
+          <a:extLst>
+            <a:ext uri="{FF2B5EF4-FFF2-40B4-BE49-F238E27FC236}">
+              <a16:creationId xmlns:a16="http://schemas.microsoft.com/office/drawing/2014/main" id="{E959F087-D128-72DE-21D6-C9DD9CC18706}"/>
+            </a:ext>
+          </a:extLst>
+        </p:cNvPr>
         <p:cNvGrpSpPr/>
         <p:nvPr/>
       </p:nvGrpSpPr>
@@ -3327,7 +3518,7 @@
           <p:cNvPr id="6" name="Group 5">
             <a:extLst>
               <a:ext uri="{FF2B5EF4-FFF2-40B4-BE49-F238E27FC236}">
-                <a16:creationId xmlns:a16="http://schemas.microsoft.com/office/drawing/2014/main" id="{061F2BC8-79B0-749B-D37C-3BFD661C8C31}"/>
+                <a16:creationId xmlns:a16="http://schemas.microsoft.com/office/drawing/2014/main" id="{4A190794-5F74-44DB-641F-D4C90B245653}"/>
               </a:ext>
             </a:extLst>
           </p:cNvPr>
@@ -3347,7 +3538,7 @@
             <p:cNvPr id="4" name="Rectangle 3">
               <a:extLst>
                 <a:ext uri="{FF2B5EF4-FFF2-40B4-BE49-F238E27FC236}">
-                  <a16:creationId xmlns:a16="http://schemas.microsoft.com/office/drawing/2014/main" id="{C4992DB3-079E-6F07-E07F-C61D86FC07E9}"/>
+                  <a16:creationId xmlns:a16="http://schemas.microsoft.com/office/drawing/2014/main" id="{CBD549B5-A00F-2BCB-80FF-28F989BF4E12}"/>
                 </a:ext>
               </a:extLst>
             </p:cNvPr>
@@ -3406,7 +3597,7 @@
             <p:cNvPr id="5" name="Rectangle 4">
               <a:extLst>
                 <a:ext uri="{FF2B5EF4-FFF2-40B4-BE49-F238E27FC236}">
-                  <a16:creationId xmlns:a16="http://schemas.microsoft.com/office/drawing/2014/main" id="{60D2601A-CC45-3754-8278-84994930F363}"/>
+                  <a16:creationId xmlns:a16="http://schemas.microsoft.com/office/drawing/2014/main" id="{FD6EC7AD-88CC-5B79-80A2-5EE161BC6754}"/>
                 </a:ext>
               </a:extLst>
             </p:cNvPr>
@@ -3461,7 +3652,7 @@
           <p:cNvPr id="7" name="Group 6">
             <a:extLst>
               <a:ext uri="{FF2B5EF4-FFF2-40B4-BE49-F238E27FC236}">
-                <a16:creationId xmlns:a16="http://schemas.microsoft.com/office/drawing/2014/main" id="{2890FF31-C186-95AE-BE73-E84D829EB717}"/>
+                <a16:creationId xmlns:a16="http://schemas.microsoft.com/office/drawing/2014/main" id="{3B9132A3-DE93-611C-1E46-AECFA69B3F5D}"/>
               </a:ext>
             </a:extLst>
           </p:cNvPr>
@@ -3481,7 +3672,7 @@
             <p:cNvPr id="8" name="Rectangle 7">
               <a:extLst>
                 <a:ext uri="{FF2B5EF4-FFF2-40B4-BE49-F238E27FC236}">
-                  <a16:creationId xmlns:a16="http://schemas.microsoft.com/office/drawing/2014/main" id="{4B0ADD57-C0D7-2B4A-1377-C9BE9C0ADBAC}"/>
+                  <a16:creationId xmlns:a16="http://schemas.microsoft.com/office/drawing/2014/main" id="{16F7428F-C80F-8538-4DD9-4E1BD7965325}"/>
                 </a:ext>
               </a:extLst>
             </p:cNvPr>
@@ -3540,7 +3731,7 @@
             <p:cNvPr id="9" name="Rectangle 8">
               <a:extLst>
                 <a:ext uri="{FF2B5EF4-FFF2-40B4-BE49-F238E27FC236}">
-                  <a16:creationId xmlns:a16="http://schemas.microsoft.com/office/drawing/2014/main" id="{D0788639-33D1-8717-4FED-D0971CB05E99}"/>
+                  <a16:creationId xmlns:a16="http://schemas.microsoft.com/office/drawing/2014/main" id="{662E38EB-71B6-264A-968B-2216A2C0D328}"/>
                 </a:ext>
               </a:extLst>
             </p:cNvPr>
@@ -3592,7 +3783,7 @@
           <p:cNvPr id="11" name="Straight Arrow Connector 10">
             <a:extLst>
               <a:ext uri="{FF2B5EF4-FFF2-40B4-BE49-F238E27FC236}">
-                <a16:creationId xmlns:a16="http://schemas.microsoft.com/office/drawing/2014/main" id="{F2CF6455-0992-97F1-B1EE-E45C46B8E130}"/>
+                <a16:creationId xmlns:a16="http://schemas.microsoft.com/office/drawing/2014/main" id="{4D3E1D30-70E1-1AD4-98F0-1258EC006CE9}"/>
               </a:ext>
             </a:extLst>
           </p:cNvPr>
@@ -3634,7 +3825,7 @@
           <p:cNvPr id="12" name="Group 11">
             <a:extLst>
               <a:ext uri="{FF2B5EF4-FFF2-40B4-BE49-F238E27FC236}">
-                <a16:creationId xmlns:a16="http://schemas.microsoft.com/office/drawing/2014/main" id="{D3934392-9AE5-98BF-0670-FCFEB6ECE21A}"/>
+                <a16:creationId xmlns:a16="http://schemas.microsoft.com/office/drawing/2014/main" id="{F5738269-F038-6AE2-F809-D0A19B5DD448}"/>
               </a:ext>
             </a:extLst>
           </p:cNvPr>
@@ -3654,7 +3845,7 @@
             <p:cNvPr id="13" name="Rectangle 12">
               <a:extLst>
                 <a:ext uri="{FF2B5EF4-FFF2-40B4-BE49-F238E27FC236}">
-                  <a16:creationId xmlns:a16="http://schemas.microsoft.com/office/drawing/2014/main" id="{6F3AA1C8-D84A-06FD-CFCF-BCF0387BC0D9}"/>
+                  <a16:creationId xmlns:a16="http://schemas.microsoft.com/office/drawing/2014/main" id="{29041BB7-9F5C-F0DB-B429-62E17344E9EF}"/>
                 </a:ext>
               </a:extLst>
             </p:cNvPr>
@@ -3713,7 +3904,7 @@
             <p:cNvPr id="14" name="Rectangle 13">
               <a:extLst>
                 <a:ext uri="{FF2B5EF4-FFF2-40B4-BE49-F238E27FC236}">
-                  <a16:creationId xmlns:a16="http://schemas.microsoft.com/office/drawing/2014/main" id="{72CCA57E-0AFB-B399-E396-57380EE44B3D}"/>
+                  <a16:creationId xmlns:a16="http://schemas.microsoft.com/office/drawing/2014/main" id="{A75B2096-3787-8B5B-FAF5-9F93D34C0482}"/>
                 </a:ext>
               </a:extLst>
             </p:cNvPr>
@@ -3768,7 +3959,7 @@
           <p:cNvPr id="15" name="Group 14">
             <a:extLst>
               <a:ext uri="{FF2B5EF4-FFF2-40B4-BE49-F238E27FC236}">
-                <a16:creationId xmlns:a16="http://schemas.microsoft.com/office/drawing/2014/main" id="{E0DF2793-1493-3FCE-5E4C-CA6ECBDE8DE1}"/>
+                <a16:creationId xmlns:a16="http://schemas.microsoft.com/office/drawing/2014/main" id="{3D82782E-404D-6C4E-8C8B-C902F4B0615F}"/>
               </a:ext>
             </a:extLst>
           </p:cNvPr>
@@ -3788,7 +3979,7 @@
             <p:cNvPr id="16" name="Rectangle 15">
               <a:extLst>
                 <a:ext uri="{FF2B5EF4-FFF2-40B4-BE49-F238E27FC236}">
-                  <a16:creationId xmlns:a16="http://schemas.microsoft.com/office/drawing/2014/main" id="{FBA8C847-7F65-925D-8333-6E96F1257A9D}"/>
+                  <a16:creationId xmlns:a16="http://schemas.microsoft.com/office/drawing/2014/main" id="{A82A8455-1907-DE42-25ED-BB13F2E5CCA6}"/>
                 </a:ext>
               </a:extLst>
             </p:cNvPr>
@@ -3847,7 +4038,7 @@
             <p:cNvPr id="17" name="Rectangle 16">
               <a:extLst>
                 <a:ext uri="{FF2B5EF4-FFF2-40B4-BE49-F238E27FC236}">
-                  <a16:creationId xmlns:a16="http://schemas.microsoft.com/office/drawing/2014/main" id="{59264531-E4AE-8A48-96A3-D302204AE070}"/>
+                  <a16:creationId xmlns:a16="http://schemas.microsoft.com/office/drawing/2014/main" id="{0E5D6088-4CCA-4FCF-E643-72D8B57FDFFC}"/>
                 </a:ext>
               </a:extLst>
             </p:cNvPr>
@@ -3897,467 +4088,10 @@
           </p:txBody>
         </p:sp>
       </p:grpSp>
-      <p:grpSp>
-        <p:nvGrpSpPr>
-          <p:cNvPr id="18" name="Group 17">
-            <a:extLst>
-              <a:ext uri="{FF2B5EF4-FFF2-40B4-BE49-F238E27FC236}">
-                <a16:creationId xmlns:a16="http://schemas.microsoft.com/office/drawing/2014/main" id="{96788434-693A-BFF5-443E-7361E12A1365}"/>
-              </a:ext>
-            </a:extLst>
-          </p:cNvPr>
-          <p:cNvGrpSpPr/>
-          <p:nvPr/>
-        </p:nvGrpSpPr>
-        <p:grpSpPr>
-          <a:xfrm>
-            <a:off x="8030463" y="5101241"/>
-            <a:ext cx="3857387" cy="578223"/>
-            <a:chOff x="5311587" y="618565"/>
-            <a:chExt cx="2171701" cy="470646"/>
-          </a:xfrm>
-        </p:grpSpPr>
-        <p:sp>
-          <p:nvSpPr>
-            <p:cNvPr id="19" name="Rectangle 18">
-              <a:extLst>
-                <a:ext uri="{FF2B5EF4-FFF2-40B4-BE49-F238E27FC236}">
-                  <a16:creationId xmlns:a16="http://schemas.microsoft.com/office/drawing/2014/main" id="{0CA4A5FB-CBEF-DD02-128C-5683702B9411}"/>
-                </a:ext>
-              </a:extLst>
-            </p:cNvPr>
-            <p:cNvSpPr/>
-            <p:nvPr/>
-          </p:nvSpPr>
-          <p:spPr>
-            <a:xfrm>
-              <a:off x="5311587" y="618565"/>
-              <a:ext cx="2171700" cy="235323"/>
-            </a:xfrm>
-            <a:prstGeom prst="rect">
-              <a:avLst/>
-            </a:prstGeom>
-            <a:solidFill>
-              <a:schemeClr val="accent5">
-                <a:lumMod val="20000"/>
-                <a:lumOff val="80000"/>
-              </a:schemeClr>
-            </a:solidFill>
-          </p:spPr>
-          <p:style>
-            <a:lnRef idx="2">
-              <a:schemeClr val="accent1">
-                <a:shade val="15000"/>
-              </a:schemeClr>
-            </a:lnRef>
-            <a:fillRef idx="1">
-              <a:schemeClr val="accent1"/>
-            </a:fillRef>
-            <a:effectRef idx="0">
-              <a:schemeClr val="accent1"/>
-            </a:effectRef>
-            <a:fontRef idx="minor">
-              <a:schemeClr val="lt1"/>
-            </a:fontRef>
-          </p:style>
-          <p:txBody>
-            <a:bodyPr rtlCol="0" anchor="ctr"/>
-            <a:lstStyle/>
-            <a:p>
-              <a:pPr algn="ctr"/>
-              <a:r>
-                <a:rPr lang="en-US" dirty="0">
-                  <a:solidFill>
-                    <a:schemeClr val="tx1"/>
-                  </a:solidFill>
-                </a:rPr>
-                <a:t>process_asmr_projected_v3.py</a:t>
-              </a:r>
-            </a:p>
-          </p:txBody>
-        </p:sp>
-        <p:sp>
-          <p:nvSpPr>
-            <p:cNvPr id="20" name="Rectangle 19">
-              <a:extLst>
-                <a:ext uri="{FF2B5EF4-FFF2-40B4-BE49-F238E27FC236}">
-                  <a16:creationId xmlns:a16="http://schemas.microsoft.com/office/drawing/2014/main" id="{2EFD5B99-8C24-5646-240B-99762145076D}"/>
-                </a:ext>
-              </a:extLst>
-            </p:cNvPr>
-            <p:cNvSpPr/>
-            <p:nvPr/>
-          </p:nvSpPr>
-          <p:spPr>
-            <a:xfrm>
-              <a:off x="5311588" y="853888"/>
-              <a:ext cx="2171700" cy="235323"/>
-            </a:xfrm>
-            <a:prstGeom prst="rect">
-              <a:avLst/>
-            </a:prstGeom>
-            <a:noFill/>
-          </p:spPr>
-          <p:style>
-            <a:lnRef idx="2">
-              <a:schemeClr val="accent1">
-                <a:shade val="15000"/>
-              </a:schemeClr>
-            </a:lnRef>
-            <a:fillRef idx="1">
-              <a:schemeClr val="accent1"/>
-            </a:fillRef>
-            <a:effectRef idx="0">
-              <a:schemeClr val="accent1"/>
-            </a:effectRef>
-            <a:fontRef idx="minor">
-              <a:schemeClr val="lt1"/>
-            </a:fontRef>
-          </p:style>
-          <p:txBody>
-            <a:bodyPr rtlCol="0" anchor="ctr"/>
-            <a:lstStyle/>
-            <a:p>
-              <a:pPr algn="ctr"/>
-              <a:r>
-                <a:rPr lang="en-US" dirty="0">
-                  <a:solidFill>
-                    <a:schemeClr val="tx1"/>
-                  </a:solidFill>
-                </a:rPr>
-                <a:t>age_specific_mortality_v3</a:t>
-              </a:r>
-            </a:p>
-          </p:txBody>
-        </p:sp>
-      </p:grpSp>
-      <p:grpSp>
-        <p:nvGrpSpPr>
-          <p:cNvPr id="21" name="Group 20">
-            <a:extLst>
-              <a:ext uri="{FF2B5EF4-FFF2-40B4-BE49-F238E27FC236}">
-                <a16:creationId xmlns:a16="http://schemas.microsoft.com/office/drawing/2014/main" id="{006D0852-2BA0-D267-C893-793AA4002BE7}"/>
-              </a:ext>
-            </a:extLst>
-          </p:cNvPr>
-          <p:cNvGrpSpPr>
-            <a:grpSpLocks/>
-          </p:cNvGrpSpPr>
-          <p:nvPr/>
-        </p:nvGrpSpPr>
-        <p:grpSpPr>
-          <a:xfrm>
-            <a:off x="205545" y="2773938"/>
-            <a:ext cx="3857385" cy="578224"/>
-            <a:chOff x="1095086" y="-293540"/>
-            <a:chExt cx="2171700" cy="470647"/>
-          </a:xfrm>
-        </p:grpSpPr>
-        <p:sp>
-          <p:nvSpPr>
-            <p:cNvPr id="22" name="Rectangle 21">
-              <a:extLst>
-                <a:ext uri="{FF2B5EF4-FFF2-40B4-BE49-F238E27FC236}">
-                  <a16:creationId xmlns:a16="http://schemas.microsoft.com/office/drawing/2014/main" id="{41AF79F5-C8BD-32FC-4785-3A3343454BC2}"/>
-                </a:ext>
-              </a:extLst>
-            </p:cNvPr>
-            <p:cNvSpPr>
-              <a:spLocks/>
-            </p:cNvSpPr>
-            <p:nvPr/>
-          </p:nvSpPr>
-          <p:spPr>
-            <a:xfrm>
-              <a:off x="1095086" y="-293540"/>
-              <a:ext cx="2171700" cy="235323"/>
-            </a:xfrm>
-            <a:prstGeom prst="rect">
-              <a:avLst/>
-            </a:prstGeom>
-            <a:solidFill>
-              <a:schemeClr val="accent5">
-                <a:lumMod val="20000"/>
-                <a:lumOff val="80000"/>
-              </a:schemeClr>
-            </a:solidFill>
-          </p:spPr>
-          <p:style>
-            <a:lnRef idx="2">
-              <a:schemeClr val="accent1">
-                <a:shade val="15000"/>
-              </a:schemeClr>
-            </a:lnRef>
-            <a:fillRef idx="1">
-              <a:schemeClr val="accent1"/>
-            </a:fillRef>
-            <a:effectRef idx="0">
-              <a:schemeClr val="accent1"/>
-            </a:effectRef>
-            <a:fontRef idx="minor">
-              <a:schemeClr val="lt1"/>
-            </a:fontRef>
-          </p:style>
-          <p:txBody>
-            <a:bodyPr rtlCol="0" anchor="ctr"/>
-            <a:lstStyle/>
-            <a:p>
-              <a:pPr algn="ctr"/>
-              <a:r>
-                <a:rPr lang="en-US" dirty="0">
-                  <a:solidFill>
-                    <a:schemeClr val="tx1"/>
-                  </a:solidFill>
-                </a:rPr>
-                <a:t>process_asmr_projected_v2.py</a:t>
-              </a:r>
-            </a:p>
-          </p:txBody>
-        </p:sp>
-        <p:sp>
-          <p:nvSpPr>
-            <p:cNvPr id="23" name="Rectangle 22">
-              <a:extLst>
-                <a:ext uri="{FF2B5EF4-FFF2-40B4-BE49-F238E27FC236}">
-                  <a16:creationId xmlns:a16="http://schemas.microsoft.com/office/drawing/2014/main" id="{8543597D-F35D-397E-5040-A3818E5D6E94}"/>
-                </a:ext>
-              </a:extLst>
-            </p:cNvPr>
-            <p:cNvSpPr>
-              <a:spLocks/>
-            </p:cNvSpPr>
-            <p:nvPr/>
-          </p:nvSpPr>
-          <p:spPr>
-            <a:xfrm>
-              <a:off x="1095086" y="-58216"/>
-              <a:ext cx="2171700" cy="235323"/>
-            </a:xfrm>
-            <a:prstGeom prst="rect">
-              <a:avLst/>
-            </a:prstGeom>
-            <a:noFill/>
-          </p:spPr>
-          <p:style>
-            <a:lnRef idx="2">
-              <a:schemeClr val="accent1">
-                <a:shade val="15000"/>
-              </a:schemeClr>
-            </a:lnRef>
-            <a:fillRef idx="1">
-              <a:schemeClr val="accent1"/>
-            </a:fillRef>
-            <a:effectRef idx="0">
-              <a:schemeClr val="accent1"/>
-            </a:effectRef>
-            <a:fontRef idx="minor">
-              <a:schemeClr val="lt1"/>
-            </a:fontRef>
-          </p:style>
-          <p:txBody>
-            <a:bodyPr rtlCol="0" anchor="ctr"/>
-            <a:lstStyle/>
-            <a:p>
-              <a:pPr algn="ctr"/>
-              <a:r>
-                <a:rPr lang="en-US" dirty="0">
-                  <a:solidFill>
-                    <a:schemeClr val="tx1"/>
-                  </a:solidFill>
-                </a:rPr>
-                <a:t>age_specific_net_migration_v2</a:t>
-              </a:r>
-            </a:p>
-          </p:txBody>
-        </p:sp>
-      </p:grpSp>
-      <p:cxnSp>
-        <p:nvCxnSpPr>
-          <p:cNvPr id="24" name="Straight Arrow Connector 23">
-            <a:extLst>
-              <a:ext uri="{FF2B5EF4-FFF2-40B4-BE49-F238E27FC236}">
-                <a16:creationId xmlns:a16="http://schemas.microsoft.com/office/drawing/2014/main" id="{92F2182D-1E60-C181-4C1C-F601E5F82F92}"/>
-              </a:ext>
-            </a:extLst>
-          </p:cNvPr>
-          <p:cNvCxnSpPr>
-            <a:cxnSpLocks/>
-            <a:stCxn id="22" idx="0"/>
-            <a:endCxn id="30" idx="2"/>
-          </p:cNvCxnSpPr>
-          <p:nvPr/>
-        </p:nvCxnSpPr>
-        <p:spPr>
-          <a:xfrm flipV="1">
-            <a:off x="2134238" y="2440799"/>
-            <a:ext cx="2" cy="333139"/>
-          </a:xfrm>
-          <a:prstGeom prst="straightConnector1">
-            <a:avLst/>
-          </a:prstGeom>
-          <a:ln>
-            <a:tailEnd type="triangle" w="lg" len="lg"/>
-          </a:ln>
-        </p:spPr>
-        <p:style>
-          <a:lnRef idx="2">
-            <a:schemeClr val="accent1"/>
-          </a:lnRef>
-          <a:fillRef idx="0">
-            <a:schemeClr val="accent1"/>
-          </a:fillRef>
-          <a:effectRef idx="1">
-            <a:schemeClr val="accent1"/>
-          </a:effectRef>
-          <a:fontRef idx="minor">
-            <a:schemeClr val="tx1"/>
-          </a:fontRef>
-        </p:style>
-      </p:cxnSp>
-      <p:grpSp>
-        <p:nvGrpSpPr>
-          <p:cNvPr id="28" name="Group 27">
-            <a:extLst>
-              <a:ext uri="{FF2B5EF4-FFF2-40B4-BE49-F238E27FC236}">
-                <a16:creationId xmlns:a16="http://schemas.microsoft.com/office/drawing/2014/main" id="{11A1BDC2-F9CA-C499-115B-CD7136289A79}"/>
-              </a:ext>
-            </a:extLst>
-          </p:cNvPr>
-          <p:cNvGrpSpPr>
-            <a:grpSpLocks/>
-          </p:cNvGrpSpPr>
-          <p:nvPr/>
-        </p:nvGrpSpPr>
-        <p:grpSpPr>
-          <a:xfrm>
-            <a:off x="205545" y="1862575"/>
-            <a:ext cx="3857387" cy="578223"/>
-            <a:chOff x="5311587" y="618565"/>
-            <a:chExt cx="2171701" cy="470646"/>
-          </a:xfrm>
-        </p:grpSpPr>
-        <p:sp>
-          <p:nvSpPr>
-            <p:cNvPr id="29" name="Rectangle 28">
-              <a:extLst>
-                <a:ext uri="{FF2B5EF4-FFF2-40B4-BE49-F238E27FC236}">
-                  <a16:creationId xmlns:a16="http://schemas.microsoft.com/office/drawing/2014/main" id="{2F346B30-5253-BBB0-E968-709790831E16}"/>
-                </a:ext>
-              </a:extLst>
-            </p:cNvPr>
-            <p:cNvSpPr>
-              <a:spLocks/>
-            </p:cNvSpPr>
-            <p:nvPr/>
-          </p:nvSpPr>
-          <p:spPr>
-            <a:xfrm>
-              <a:off x="5311587" y="618565"/>
-              <a:ext cx="2171700" cy="235323"/>
-            </a:xfrm>
-            <a:prstGeom prst="rect">
-              <a:avLst/>
-            </a:prstGeom>
-            <a:solidFill>
-              <a:schemeClr val="accent5">
-                <a:lumMod val="20000"/>
-                <a:lumOff val="80000"/>
-              </a:schemeClr>
-            </a:solidFill>
-          </p:spPr>
-          <p:style>
-            <a:lnRef idx="2">
-              <a:schemeClr val="accent1">
-                <a:shade val="15000"/>
-              </a:schemeClr>
-            </a:lnRef>
-            <a:fillRef idx="1">
-              <a:schemeClr val="accent1"/>
-            </a:fillRef>
-            <a:effectRef idx="0">
-              <a:schemeClr val="accent1"/>
-            </a:effectRef>
-            <a:fontRef idx="minor">
-              <a:schemeClr val="lt1"/>
-            </a:fontRef>
-          </p:style>
-          <p:txBody>
-            <a:bodyPr rtlCol="0" anchor="ctr"/>
-            <a:lstStyle/>
-            <a:p>
-              <a:pPr algn="ctr"/>
-              <a:r>
-                <a:rPr lang="en-US" dirty="0">
-                  <a:solidFill>
-                    <a:schemeClr val="tx1"/>
-                  </a:solidFill>
-                </a:rPr>
-                <a:t>process_asmig_projected_v3.py</a:t>
-              </a:r>
-            </a:p>
-          </p:txBody>
-        </p:sp>
-        <p:sp>
-          <p:nvSpPr>
-            <p:cNvPr id="30" name="Rectangle 29">
-              <a:extLst>
-                <a:ext uri="{FF2B5EF4-FFF2-40B4-BE49-F238E27FC236}">
-                  <a16:creationId xmlns:a16="http://schemas.microsoft.com/office/drawing/2014/main" id="{8C86D6A1-E678-A94D-572B-C5520C1EF47C}"/>
-                </a:ext>
-              </a:extLst>
-            </p:cNvPr>
-            <p:cNvSpPr>
-              <a:spLocks/>
-            </p:cNvSpPr>
-            <p:nvPr/>
-          </p:nvSpPr>
-          <p:spPr>
-            <a:xfrm>
-              <a:off x="5311588" y="853888"/>
-              <a:ext cx="2171700" cy="235323"/>
-            </a:xfrm>
-            <a:prstGeom prst="rect">
-              <a:avLst/>
-            </a:prstGeom>
-            <a:noFill/>
-          </p:spPr>
-          <p:style>
-            <a:lnRef idx="2">
-              <a:schemeClr val="accent1">
-                <a:shade val="15000"/>
-              </a:schemeClr>
-            </a:lnRef>
-            <a:fillRef idx="1">
-              <a:schemeClr val="accent1"/>
-            </a:fillRef>
-            <a:effectRef idx="0">
-              <a:schemeClr val="accent1"/>
-            </a:effectRef>
-            <a:fontRef idx="minor">
-              <a:schemeClr val="lt1"/>
-            </a:fontRef>
-          </p:style>
-          <p:txBody>
-            <a:bodyPr rtlCol="0" anchor="ctr"/>
-            <a:lstStyle/>
-            <a:p>
-              <a:pPr algn="ctr"/>
-              <a:r>
-                <a:rPr lang="en-US" dirty="0">
-                  <a:solidFill>
-                    <a:schemeClr val="tx1"/>
-                  </a:solidFill>
-                </a:rPr>
-                <a:t>age_specific_net_migration_v3</a:t>
-              </a:r>
-            </a:p>
-          </p:txBody>
-        </p:sp>
-      </p:grpSp>
     </p:spTree>
     <p:extLst>
       <p:ext uri="{BB962C8B-B14F-4D97-AF65-F5344CB8AC3E}">
-        <p14:creationId xmlns:p14="http://schemas.microsoft.com/office/powerpoint/2010/main" val="863778225"/>
+        <p14:creationId xmlns:p14="http://schemas.microsoft.com/office/powerpoint/2010/main" val="2616424035"/>
       </p:ext>
     </p:extLst>
   </p:cSld>
@@ -4788,7 +4522,23 @@
                     <a:schemeClr val="tx1"/>
                   </a:solidFill>
                 </a:rPr>
-                <a:t>acs_immigration_cohort_fractions_by_age_group_2006-2015</a:t>
+                <a:t>acs_immigration_cohort</a:t>
+              </a:r>
+              <a:r>
+                <a:rPr lang="en-US">
+                  <a:solidFill>
+                    <a:schemeClr val="tx1"/>
+                  </a:solidFill>
+                </a:rPr>
+                <a:t>_fractions_</a:t>
+              </a:r>
+              <a:r>
+                <a:rPr lang="en-US" dirty="0">
+                  <a:solidFill>
+                    <a:schemeClr val="tx1"/>
+                  </a:solidFill>
+                </a:rPr>
+                <a:t>2006-2015</a:t>
               </a:r>
             </a:p>
           </p:txBody>
@@ -4841,6 +4591,490 @@
     <p:extLst>
       <p:ext uri="{BB962C8B-B14F-4D97-AF65-F5344CB8AC3E}">
         <p14:creationId xmlns:p14="http://schemas.microsoft.com/office/powerpoint/2010/main" val="2078527769"/>
+      </p:ext>
+    </p:extLst>
+  </p:cSld>
+  <p:clrMapOvr>
+    <a:masterClrMapping/>
+  </p:clrMapOvr>
+</p:sld>
+</file>
+
+<file path=ppt/slides/slide3.xml><?xml version="1.0" encoding="utf-8"?>
+<p:sld xmlns:a="http://schemas.openxmlformats.org/drawingml/2006/main" xmlns:r="http://schemas.openxmlformats.org/officeDocument/2006/relationships" xmlns:p="http://schemas.openxmlformats.org/presentationml/2006/main">
+  <p:cSld>
+    <p:spTree>
+      <p:nvGrpSpPr>
+        <p:cNvPr id="1" name=""/>
+        <p:cNvGrpSpPr/>
+        <p:nvPr/>
+      </p:nvGrpSpPr>
+      <p:grpSpPr>
+        <a:xfrm>
+          <a:off x="0" y="0"/>
+          <a:ext cx="0" cy="0"/>
+          <a:chOff x="0" y="0"/>
+          <a:chExt cx="0" cy="0"/>
+        </a:xfrm>
+      </p:grpSpPr>
+      <p:grpSp>
+        <p:nvGrpSpPr>
+          <p:cNvPr id="7" name="Group 6">
+            <a:extLst>
+              <a:ext uri="{FF2B5EF4-FFF2-40B4-BE49-F238E27FC236}">
+                <a16:creationId xmlns:a16="http://schemas.microsoft.com/office/drawing/2014/main" id="{2890FF31-C186-95AE-BE73-E84D829EB717}"/>
+              </a:ext>
+            </a:extLst>
+          </p:cNvPr>
+          <p:cNvGrpSpPr/>
+          <p:nvPr/>
+        </p:nvGrpSpPr>
+        <p:grpSpPr>
+          <a:xfrm>
+            <a:off x="4167307" y="2850777"/>
+            <a:ext cx="3857385" cy="578223"/>
+            <a:chOff x="5311587" y="618565"/>
+            <a:chExt cx="2171700" cy="470646"/>
+          </a:xfrm>
+        </p:grpSpPr>
+        <p:sp>
+          <p:nvSpPr>
+            <p:cNvPr id="8" name="Rectangle 7">
+              <a:extLst>
+                <a:ext uri="{FF2B5EF4-FFF2-40B4-BE49-F238E27FC236}">
+                  <a16:creationId xmlns:a16="http://schemas.microsoft.com/office/drawing/2014/main" id="{4B0ADD57-C0D7-2B4A-1377-C9BE9C0ADBAC}"/>
+                </a:ext>
+              </a:extLst>
+            </p:cNvPr>
+            <p:cNvSpPr/>
+            <p:nvPr/>
+          </p:nvSpPr>
+          <p:spPr>
+            <a:xfrm>
+              <a:off x="5311587" y="618565"/>
+              <a:ext cx="2171700" cy="235323"/>
+            </a:xfrm>
+            <a:prstGeom prst="rect">
+              <a:avLst/>
+            </a:prstGeom>
+            <a:solidFill>
+              <a:schemeClr val="accent2">
+                <a:lumMod val="60000"/>
+                <a:lumOff val="40000"/>
+              </a:schemeClr>
+            </a:solidFill>
+          </p:spPr>
+          <p:style>
+            <a:lnRef idx="2">
+              <a:schemeClr val="accent1">
+                <a:shade val="15000"/>
+              </a:schemeClr>
+            </a:lnRef>
+            <a:fillRef idx="1">
+              <a:schemeClr val="accent1"/>
+            </a:fillRef>
+            <a:effectRef idx="0">
+              <a:schemeClr val="accent1"/>
+            </a:effectRef>
+            <a:fontRef idx="minor">
+              <a:schemeClr val="lt1"/>
+            </a:fontRef>
+          </p:style>
+          <p:txBody>
+            <a:bodyPr rtlCol="0" anchor="ctr"/>
+            <a:lstStyle/>
+            <a:p>
+              <a:pPr algn="ctr"/>
+              <a:r>
+                <a:rPr lang="en-US" dirty="0">
+                  <a:solidFill>
+                    <a:schemeClr val="tx1"/>
+                  </a:solidFill>
+                </a:rPr>
+                <a:t>iclus_Wittgenstein_v3.py</a:t>
+              </a:r>
+            </a:p>
+          </p:txBody>
+        </p:sp>
+        <p:sp>
+          <p:nvSpPr>
+            <p:cNvPr id="9" name="Rectangle 8">
+              <a:extLst>
+                <a:ext uri="{FF2B5EF4-FFF2-40B4-BE49-F238E27FC236}">
+                  <a16:creationId xmlns:a16="http://schemas.microsoft.com/office/drawing/2014/main" id="{D0788639-33D1-8717-4FED-D0971CB05E99}"/>
+                </a:ext>
+              </a:extLst>
+            </p:cNvPr>
+            <p:cNvSpPr/>
+            <p:nvPr/>
+          </p:nvSpPr>
+          <p:spPr>
+            <a:xfrm>
+              <a:off x="5311587" y="853888"/>
+              <a:ext cx="2171700" cy="235323"/>
+            </a:xfrm>
+            <a:prstGeom prst="rect">
+              <a:avLst/>
+            </a:prstGeom>
+            <a:noFill/>
+          </p:spPr>
+          <p:style>
+            <a:lnRef idx="2">
+              <a:schemeClr val="accent1">
+                <a:shade val="15000"/>
+              </a:schemeClr>
+            </a:lnRef>
+            <a:fillRef idx="1">
+              <a:schemeClr val="accent1"/>
+            </a:fillRef>
+            <a:effectRef idx="0">
+              <a:schemeClr val="accent1"/>
+            </a:effectRef>
+            <a:fontRef idx="minor">
+              <a:schemeClr val="lt1"/>
+            </a:fontRef>
+          </p:style>
+          <p:txBody>
+            <a:bodyPr rtlCol="0" anchor="ctr"/>
+            <a:lstStyle/>
+            <a:p>
+              <a:pPr algn="ctr"/>
+              <a:endParaRPr lang="en-US" dirty="0">
+                <a:solidFill>
+                  <a:schemeClr val="tx1"/>
+                </a:solidFill>
+              </a:endParaRPr>
+            </a:p>
+          </p:txBody>
+        </p:sp>
+      </p:grpSp>
+      <p:grpSp>
+        <p:nvGrpSpPr>
+          <p:cNvPr id="21" name="Group 20">
+            <a:extLst>
+              <a:ext uri="{FF2B5EF4-FFF2-40B4-BE49-F238E27FC236}">
+                <a16:creationId xmlns:a16="http://schemas.microsoft.com/office/drawing/2014/main" id="{006D0852-2BA0-D267-C893-793AA4002BE7}"/>
+              </a:ext>
+            </a:extLst>
+          </p:cNvPr>
+          <p:cNvGrpSpPr>
+            <a:grpSpLocks/>
+          </p:cNvGrpSpPr>
+          <p:nvPr/>
+        </p:nvGrpSpPr>
+        <p:grpSpPr>
+          <a:xfrm>
+            <a:off x="205545" y="2773938"/>
+            <a:ext cx="3857385" cy="578224"/>
+            <a:chOff x="1095086" y="-293540"/>
+            <a:chExt cx="2171700" cy="470647"/>
+          </a:xfrm>
+        </p:grpSpPr>
+        <p:sp>
+          <p:nvSpPr>
+            <p:cNvPr id="22" name="Rectangle 21">
+              <a:extLst>
+                <a:ext uri="{FF2B5EF4-FFF2-40B4-BE49-F238E27FC236}">
+                  <a16:creationId xmlns:a16="http://schemas.microsoft.com/office/drawing/2014/main" id="{41AF79F5-C8BD-32FC-4785-3A3343454BC2}"/>
+                </a:ext>
+              </a:extLst>
+            </p:cNvPr>
+            <p:cNvSpPr>
+              <a:spLocks/>
+            </p:cNvSpPr>
+            <p:nvPr/>
+          </p:nvSpPr>
+          <p:spPr>
+            <a:xfrm>
+              <a:off x="1095086" y="-293540"/>
+              <a:ext cx="2171700" cy="235323"/>
+            </a:xfrm>
+            <a:prstGeom prst="rect">
+              <a:avLst/>
+            </a:prstGeom>
+            <a:solidFill>
+              <a:schemeClr val="accent5">
+                <a:lumMod val="20000"/>
+                <a:lumOff val="80000"/>
+              </a:schemeClr>
+            </a:solidFill>
+          </p:spPr>
+          <p:style>
+            <a:lnRef idx="2">
+              <a:schemeClr val="accent1">
+                <a:shade val="15000"/>
+              </a:schemeClr>
+            </a:lnRef>
+            <a:fillRef idx="1">
+              <a:schemeClr val="accent1"/>
+            </a:fillRef>
+            <a:effectRef idx="0">
+              <a:schemeClr val="accent1"/>
+            </a:effectRef>
+            <a:fontRef idx="minor">
+              <a:schemeClr val="lt1"/>
+            </a:fontRef>
+          </p:style>
+          <p:txBody>
+            <a:bodyPr rtlCol="0" anchor="ctr"/>
+            <a:lstStyle/>
+            <a:p>
+              <a:pPr algn="ctr"/>
+              <a:r>
+                <a:rPr lang="en-US" dirty="0">
+                  <a:solidFill>
+                    <a:schemeClr val="tx1"/>
+                  </a:solidFill>
+                </a:rPr>
+                <a:t>process_asmr_projected_v2.py</a:t>
+              </a:r>
+            </a:p>
+          </p:txBody>
+        </p:sp>
+        <p:sp>
+          <p:nvSpPr>
+            <p:cNvPr id="23" name="Rectangle 22">
+              <a:extLst>
+                <a:ext uri="{FF2B5EF4-FFF2-40B4-BE49-F238E27FC236}">
+                  <a16:creationId xmlns:a16="http://schemas.microsoft.com/office/drawing/2014/main" id="{8543597D-F35D-397E-5040-A3818E5D6E94}"/>
+                </a:ext>
+              </a:extLst>
+            </p:cNvPr>
+            <p:cNvSpPr>
+              <a:spLocks/>
+            </p:cNvSpPr>
+            <p:nvPr/>
+          </p:nvSpPr>
+          <p:spPr>
+            <a:xfrm>
+              <a:off x="1095086" y="-58216"/>
+              <a:ext cx="2171700" cy="235323"/>
+            </a:xfrm>
+            <a:prstGeom prst="rect">
+              <a:avLst/>
+            </a:prstGeom>
+            <a:noFill/>
+          </p:spPr>
+          <p:style>
+            <a:lnRef idx="2">
+              <a:schemeClr val="accent1">
+                <a:shade val="15000"/>
+              </a:schemeClr>
+            </a:lnRef>
+            <a:fillRef idx="1">
+              <a:schemeClr val="accent1"/>
+            </a:fillRef>
+            <a:effectRef idx="0">
+              <a:schemeClr val="accent1"/>
+            </a:effectRef>
+            <a:fontRef idx="minor">
+              <a:schemeClr val="lt1"/>
+            </a:fontRef>
+          </p:style>
+          <p:txBody>
+            <a:bodyPr rtlCol="0" anchor="ctr"/>
+            <a:lstStyle/>
+            <a:p>
+              <a:pPr algn="ctr"/>
+              <a:r>
+                <a:rPr lang="en-US" dirty="0">
+                  <a:solidFill>
+                    <a:schemeClr val="tx1"/>
+                  </a:solidFill>
+                </a:rPr>
+                <a:t>age_specific_net_migration_v2</a:t>
+              </a:r>
+            </a:p>
+          </p:txBody>
+        </p:sp>
+      </p:grpSp>
+      <p:cxnSp>
+        <p:nvCxnSpPr>
+          <p:cNvPr id="24" name="Straight Arrow Connector 23">
+            <a:extLst>
+              <a:ext uri="{FF2B5EF4-FFF2-40B4-BE49-F238E27FC236}">
+                <a16:creationId xmlns:a16="http://schemas.microsoft.com/office/drawing/2014/main" id="{92F2182D-1E60-C181-4C1C-F601E5F82F92}"/>
+              </a:ext>
+            </a:extLst>
+          </p:cNvPr>
+          <p:cNvCxnSpPr>
+            <a:cxnSpLocks/>
+            <a:stCxn id="22" idx="0"/>
+            <a:endCxn id="30" idx="2"/>
+          </p:cNvCxnSpPr>
+          <p:nvPr/>
+        </p:nvCxnSpPr>
+        <p:spPr>
+          <a:xfrm flipV="1">
+            <a:off x="2134238" y="2440799"/>
+            <a:ext cx="2" cy="333139"/>
+          </a:xfrm>
+          <a:prstGeom prst="straightConnector1">
+            <a:avLst/>
+          </a:prstGeom>
+          <a:ln>
+            <a:tailEnd type="triangle" w="lg" len="lg"/>
+          </a:ln>
+        </p:spPr>
+        <p:style>
+          <a:lnRef idx="2">
+            <a:schemeClr val="accent1"/>
+          </a:lnRef>
+          <a:fillRef idx="0">
+            <a:schemeClr val="accent1"/>
+          </a:fillRef>
+          <a:effectRef idx="1">
+            <a:schemeClr val="accent1"/>
+          </a:effectRef>
+          <a:fontRef idx="minor">
+            <a:schemeClr val="tx1"/>
+          </a:fontRef>
+        </p:style>
+      </p:cxnSp>
+      <p:grpSp>
+        <p:nvGrpSpPr>
+          <p:cNvPr id="28" name="Group 27">
+            <a:extLst>
+              <a:ext uri="{FF2B5EF4-FFF2-40B4-BE49-F238E27FC236}">
+                <a16:creationId xmlns:a16="http://schemas.microsoft.com/office/drawing/2014/main" id="{11A1BDC2-F9CA-C499-115B-CD7136289A79}"/>
+              </a:ext>
+            </a:extLst>
+          </p:cNvPr>
+          <p:cNvGrpSpPr>
+            <a:grpSpLocks/>
+          </p:cNvGrpSpPr>
+          <p:nvPr/>
+        </p:nvGrpSpPr>
+        <p:grpSpPr>
+          <a:xfrm>
+            <a:off x="205545" y="1862575"/>
+            <a:ext cx="3857387" cy="578223"/>
+            <a:chOff x="5311587" y="618565"/>
+            <a:chExt cx="2171701" cy="470646"/>
+          </a:xfrm>
+        </p:grpSpPr>
+        <p:sp>
+          <p:nvSpPr>
+            <p:cNvPr id="29" name="Rectangle 28">
+              <a:extLst>
+                <a:ext uri="{FF2B5EF4-FFF2-40B4-BE49-F238E27FC236}">
+                  <a16:creationId xmlns:a16="http://schemas.microsoft.com/office/drawing/2014/main" id="{2F346B30-5253-BBB0-E968-709790831E16}"/>
+                </a:ext>
+              </a:extLst>
+            </p:cNvPr>
+            <p:cNvSpPr>
+              <a:spLocks/>
+            </p:cNvSpPr>
+            <p:nvPr/>
+          </p:nvSpPr>
+          <p:spPr>
+            <a:xfrm>
+              <a:off x="5311587" y="618565"/>
+              <a:ext cx="2171700" cy="235323"/>
+            </a:xfrm>
+            <a:prstGeom prst="rect">
+              <a:avLst/>
+            </a:prstGeom>
+            <a:solidFill>
+              <a:schemeClr val="accent5">
+                <a:lumMod val="20000"/>
+                <a:lumOff val="80000"/>
+              </a:schemeClr>
+            </a:solidFill>
+          </p:spPr>
+          <p:style>
+            <a:lnRef idx="2">
+              <a:schemeClr val="accent1">
+                <a:shade val="15000"/>
+              </a:schemeClr>
+            </a:lnRef>
+            <a:fillRef idx="1">
+              <a:schemeClr val="accent1"/>
+            </a:fillRef>
+            <a:effectRef idx="0">
+              <a:schemeClr val="accent1"/>
+            </a:effectRef>
+            <a:fontRef idx="minor">
+              <a:schemeClr val="lt1"/>
+            </a:fontRef>
+          </p:style>
+          <p:txBody>
+            <a:bodyPr rtlCol="0" anchor="ctr"/>
+            <a:lstStyle/>
+            <a:p>
+              <a:pPr algn="ctr"/>
+              <a:r>
+                <a:rPr lang="en-US" dirty="0">
+                  <a:solidFill>
+                    <a:schemeClr val="tx1"/>
+                  </a:solidFill>
+                </a:rPr>
+                <a:t>process_asmig_projected_v3.py</a:t>
+              </a:r>
+            </a:p>
+          </p:txBody>
+        </p:sp>
+        <p:sp>
+          <p:nvSpPr>
+            <p:cNvPr id="30" name="Rectangle 29">
+              <a:extLst>
+                <a:ext uri="{FF2B5EF4-FFF2-40B4-BE49-F238E27FC236}">
+                  <a16:creationId xmlns:a16="http://schemas.microsoft.com/office/drawing/2014/main" id="{8C86D6A1-E678-A94D-572B-C5520C1EF47C}"/>
+                </a:ext>
+              </a:extLst>
+            </p:cNvPr>
+            <p:cNvSpPr>
+              <a:spLocks/>
+            </p:cNvSpPr>
+            <p:nvPr/>
+          </p:nvSpPr>
+          <p:spPr>
+            <a:xfrm>
+              <a:off x="5311588" y="853888"/>
+              <a:ext cx="2171700" cy="235323"/>
+            </a:xfrm>
+            <a:prstGeom prst="rect">
+              <a:avLst/>
+            </a:prstGeom>
+            <a:noFill/>
+          </p:spPr>
+          <p:style>
+            <a:lnRef idx="2">
+              <a:schemeClr val="accent1">
+                <a:shade val="15000"/>
+              </a:schemeClr>
+            </a:lnRef>
+            <a:fillRef idx="1">
+              <a:schemeClr val="accent1"/>
+            </a:fillRef>
+            <a:effectRef idx="0">
+              <a:schemeClr val="accent1"/>
+            </a:effectRef>
+            <a:fontRef idx="minor">
+              <a:schemeClr val="lt1"/>
+            </a:fontRef>
+          </p:style>
+          <p:txBody>
+            <a:bodyPr rtlCol="0" anchor="ctr"/>
+            <a:lstStyle/>
+            <a:p>
+              <a:pPr algn="ctr"/>
+              <a:r>
+                <a:rPr lang="en-US" dirty="0">
+                  <a:solidFill>
+                    <a:schemeClr val="tx1"/>
+                  </a:solidFill>
+                </a:rPr>
+                <a:t>age_specific_net_migration_v3</a:t>
+              </a:r>
+            </a:p>
+          </p:txBody>
+        </p:sp>
+      </p:grpSp>
+    </p:spTree>
+    <p:extLst>
+      <p:ext uri="{BB962C8B-B14F-4D97-AF65-F5344CB8AC3E}">
+        <p14:creationId xmlns:p14="http://schemas.microsoft.com/office/powerpoint/2010/main" val="863778225"/>
       </p:ext>
     </p:extLst>
   </p:cSld>

</xml_diff>